<commit_message>
Added Travelling Salesman Problem
</commit_message>
<xml_diff>
--- a/Week 2 - Graph Theory/Graphs.pptx
+++ b/Week 2 - Graph Theory/Graphs.pptx
@@ -231,7 +231,7 @@
           <a:p>
             <a:fld id="{F666E1FD-E7A0-497B-BBC0-740BAAC97C64}" type="datetimeFigureOut">
               <a:rPr lang="en-PH" smtClean="0"/>
-              <a:t>4/3/24</a:t>
+              <a:t>4/4/24</a:t>
             </a:fld>
             <a:endParaRPr lang="en-PH"/>
           </a:p>
@@ -3588,7 +3588,7 @@
           <a:p>
             <a:fld id="{0CCF0B81-6BD8-4C65-9459-815598C5F1F4}" type="datetimeFigureOut">
               <a:rPr lang="en-PH" smtClean="0"/>
-              <a:t>4/3/24</a:t>
+              <a:t>4/4/24</a:t>
             </a:fld>
             <a:endParaRPr lang="en-PH"/>
           </a:p>
@@ -3788,7 +3788,7 @@
           <a:p>
             <a:fld id="{0CCF0B81-6BD8-4C65-9459-815598C5F1F4}" type="datetimeFigureOut">
               <a:rPr lang="en-PH" smtClean="0"/>
-              <a:t>4/3/24</a:t>
+              <a:t>4/4/24</a:t>
             </a:fld>
             <a:endParaRPr lang="en-PH"/>
           </a:p>
@@ -3998,7 +3998,7 @@
           <a:p>
             <a:fld id="{0CCF0B81-6BD8-4C65-9459-815598C5F1F4}" type="datetimeFigureOut">
               <a:rPr lang="en-PH" smtClean="0"/>
-              <a:t>4/3/24</a:t>
+              <a:t>4/4/24</a:t>
             </a:fld>
             <a:endParaRPr lang="en-PH"/>
           </a:p>
@@ -4198,7 +4198,7 @@
           <a:p>
             <a:fld id="{0CCF0B81-6BD8-4C65-9459-815598C5F1F4}" type="datetimeFigureOut">
               <a:rPr lang="en-PH" smtClean="0"/>
-              <a:t>4/3/24</a:t>
+              <a:t>4/4/24</a:t>
             </a:fld>
             <a:endParaRPr lang="en-PH"/>
           </a:p>
@@ -4474,7 +4474,7 @@
           <a:p>
             <a:fld id="{0CCF0B81-6BD8-4C65-9459-815598C5F1F4}" type="datetimeFigureOut">
               <a:rPr lang="en-PH" smtClean="0"/>
-              <a:t>4/3/24</a:t>
+              <a:t>4/4/24</a:t>
             </a:fld>
             <a:endParaRPr lang="en-PH"/>
           </a:p>
@@ -4742,7 +4742,7 @@
           <a:p>
             <a:fld id="{0CCF0B81-6BD8-4C65-9459-815598C5F1F4}" type="datetimeFigureOut">
               <a:rPr lang="en-PH" smtClean="0"/>
-              <a:t>4/3/24</a:t>
+              <a:t>4/4/24</a:t>
             </a:fld>
             <a:endParaRPr lang="en-PH"/>
           </a:p>
@@ -5157,7 +5157,7 @@
           <a:p>
             <a:fld id="{0CCF0B81-6BD8-4C65-9459-815598C5F1F4}" type="datetimeFigureOut">
               <a:rPr lang="en-PH" smtClean="0"/>
-              <a:t>4/3/24</a:t>
+              <a:t>4/4/24</a:t>
             </a:fld>
             <a:endParaRPr lang="en-PH"/>
           </a:p>
@@ -5299,7 +5299,7 @@
           <a:p>
             <a:fld id="{0CCF0B81-6BD8-4C65-9459-815598C5F1F4}" type="datetimeFigureOut">
               <a:rPr lang="en-PH" smtClean="0"/>
-              <a:t>4/3/24</a:t>
+              <a:t>4/4/24</a:t>
             </a:fld>
             <a:endParaRPr lang="en-PH"/>
           </a:p>
@@ -5412,7 +5412,7 @@
           <a:p>
             <a:fld id="{0CCF0B81-6BD8-4C65-9459-815598C5F1F4}" type="datetimeFigureOut">
               <a:rPr lang="en-PH" smtClean="0"/>
-              <a:t>4/3/24</a:t>
+              <a:t>4/4/24</a:t>
             </a:fld>
             <a:endParaRPr lang="en-PH"/>
           </a:p>
@@ -5725,7 +5725,7 @@
           <a:p>
             <a:fld id="{0CCF0B81-6BD8-4C65-9459-815598C5F1F4}" type="datetimeFigureOut">
               <a:rPr lang="en-PH" smtClean="0"/>
-              <a:t>4/3/24</a:t>
+              <a:t>4/4/24</a:t>
             </a:fld>
             <a:endParaRPr lang="en-PH"/>
           </a:p>
@@ -6014,7 +6014,7 @@
           <a:p>
             <a:fld id="{0CCF0B81-6BD8-4C65-9459-815598C5F1F4}" type="datetimeFigureOut">
               <a:rPr lang="en-PH" smtClean="0"/>
-              <a:t>4/3/24</a:t>
+              <a:t>4/4/24</a:t>
             </a:fld>
             <a:endParaRPr lang="en-PH"/>
           </a:p>
@@ -6257,7 +6257,7 @@
           <a:p>
             <a:fld id="{0CCF0B81-6BD8-4C65-9459-815598C5F1F4}" type="datetimeFigureOut">
               <a:rPr lang="en-PH" smtClean="0"/>
-              <a:t>4/3/24</a:t>
+              <a:t>4/4/24</a:t>
             </a:fld>
             <a:endParaRPr lang="en-PH"/>
           </a:p>
@@ -25415,6 +25415,164 @@
                       </p:childTnLst>
                     </p:cTn>
                   </p:par>
+                  <p:par>
+                    <p:cTn id="45" fill="hold">
+                      <p:stCondLst>
+                        <p:cond delay="indefinite"/>
+                      </p:stCondLst>
+                      <p:childTnLst>
+                        <p:par>
+                          <p:cTn id="46" fill="hold">
+                            <p:stCondLst>
+                              <p:cond delay="0"/>
+                            </p:stCondLst>
+                            <p:childTnLst>
+                              <p:par>
+                                <p:cTn id="47" presetID="3" presetClass="entr" presetSubtype="10" fill="hold" grpId="0" nodeType="clickEffect">
+                                  <p:stCondLst>
+                                    <p:cond delay="0"/>
+                                  </p:stCondLst>
+                                  <p:childTnLst>
+                                    <p:set>
+                                      <p:cBhvr>
+                                        <p:cTn id="48" dur="1" fill="hold">
+                                          <p:stCondLst>
+                                            <p:cond delay="0"/>
+                                          </p:stCondLst>
+                                        </p:cTn>
+                                        <p:tgtEl>
+                                          <p:spTgt spid="11"/>
+                                        </p:tgtEl>
+                                        <p:attrNameLst>
+                                          <p:attrName>style.visibility</p:attrName>
+                                        </p:attrNameLst>
+                                      </p:cBhvr>
+                                      <p:to>
+                                        <p:strVal val="visible"/>
+                                      </p:to>
+                                    </p:set>
+                                    <p:animEffect transition="in" filter="blinds(horizontal)">
+                                      <p:cBhvr>
+                                        <p:cTn id="49" dur="500"/>
+                                        <p:tgtEl>
+                                          <p:spTgt spid="11"/>
+                                        </p:tgtEl>
+                                      </p:cBhvr>
+                                    </p:animEffect>
+                                  </p:childTnLst>
+                                </p:cTn>
+                              </p:par>
+                              <p:par>
+                                <p:cTn id="50" presetID="3" presetClass="entr" presetSubtype="10" fill="hold" grpId="0" nodeType="withEffect">
+                                  <p:stCondLst>
+                                    <p:cond delay="0"/>
+                                  </p:stCondLst>
+                                  <p:childTnLst>
+                                    <p:set>
+                                      <p:cBhvr>
+                                        <p:cTn id="51" dur="1" fill="hold">
+                                          <p:stCondLst>
+                                            <p:cond delay="0"/>
+                                          </p:stCondLst>
+                                        </p:cTn>
+                                        <p:tgtEl>
+                                          <p:spTgt spid="23"/>
+                                        </p:tgtEl>
+                                        <p:attrNameLst>
+                                          <p:attrName>style.visibility</p:attrName>
+                                        </p:attrNameLst>
+                                      </p:cBhvr>
+                                      <p:to>
+                                        <p:strVal val="visible"/>
+                                      </p:to>
+                                    </p:set>
+                                    <p:animEffect transition="in" filter="blinds(horizontal)">
+                                      <p:cBhvr>
+                                        <p:cTn id="52" dur="500"/>
+                                        <p:tgtEl>
+                                          <p:spTgt spid="23"/>
+                                        </p:tgtEl>
+                                      </p:cBhvr>
+                                    </p:animEffect>
+                                  </p:childTnLst>
+                                </p:cTn>
+                              </p:par>
+                              <p:par>
+                                <p:cTn id="53" presetID="3" presetClass="entr" presetSubtype="10" fill="hold" grpId="0" nodeType="withEffect">
+                                  <p:stCondLst>
+                                    <p:cond delay="0"/>
+                                  </p:stCondLst>
+                                  <p:childTnLst>
+                                    <p:set>
+                                      <p:cBhvr>
+                                        <p:cTn id="54" dur="1" fill="hold">
+                                          <p:stCondLst>
+                                            <p:cond delay="0"/>
+                                          </p:stCondLst>
+                                        </p:cTn>
+                                        <p:tgtEl>
+                                          <p:spTgt spid="18"/>
+                                        </p:tgtEl>
+                                        <p:attrNameLst>
+                                          <p:attrName>style.visibility</p:attrName>
+                                        </p:attrNameLst>
+                                      </p:cBhvr>
+                                      <p:to>
+                                        <p:strVal val="visible"/>
+                                      </p:to>
+                                    </p:set>
+                                    <p:animEffect transition="in" filter="blinds(horizontal)">
+                                      <p:cBhvr>
+                                        <p:cTn id="55" dur="500"/>
+                                        <p:tgtEl>
+                                          <p:spTgt spid="18"/>
+                                        </p:tgtEl>
+                                      </p:cBhvr>
+                                    </p:animEffect>
+                                  </p:childTnLst>
+                                </p:cTn>
+                              </p:par>
+                              <p:par>
+                                <p:cTn id="56" presetID="3" presetClass="entr" presetSubtype="10" fill="hold" grpId="0" nodeType="withEffect">
+                                  <p:stCondLst>
+                                    <p:cond delay="0"/>
+                                  </p:stCondLst>
+                                  <p:childTnLst>
+                                    <p:set>
+                                      <p:cBhvr>
+                                        <p:cTn id="57" dur="1" fill="hold">
+                                          <p:stCondLst>
+                                            <p:cond delay="0"/>
+                                          </p:stCondLst>
+                                        </p:cTn>
+                                        <p:tgtEl>
+                                          <p:spTgt spid="19"/>
+                                        </p:tgtEl>
+                                        <p:attrNameLst>
+                                          <p:attrName>style.visibility</p:attrName>
+                                        </p:attrNameLst>
+                                      </p:cBhvr>
+                                      <p:to>
+                                        <p:strVal val="visible"/>
+                                      </p:to>
+                                    </p:set>
+                                    <p:animEffect transition="in" filter="blinds(horizontal)">
+                                      <p:cBhvr>
+                                        <p:cTn id="58" dur="500"/>
+                                        <p:tgtEl>
+                                          <p:spTgt spid="19"/>
+                                        </p:tgtEl>
+                                      </p:cBhvr>
+                                    </p:animEffect>
+                                  </p:childTnLst>
+                                </p:cTn>
+                              </p:par>
+                            </p:childTnLst>
+                          </p:cTn>
+                        </p:par>
+                      </p:childTnLst>
+                    </p:cTn>
+                  </p:par>
                 </p:childTnLst>
               </p:cTn>
               <p:prevCondLst>
@@ -25441,6 +25599,10 @@
       <p:bldP spid="6" grpId="0" animBg="1"/>
       <p:bldP spid="16" grpId="0" animBg="1"/>
       <p:bldP spid="17" grpId="0" animBg="1"/>
+      <p:bldP spid="11" grpId="0"/>
+      <p:bldP spid="18" grpId="0"/>
+      <p:bldP spid="19" grpId="0"/>
+      <p:bldP spid="23" grpId="0"/>
     </p:bldLst>
   </p:timing>
 </p:sld>
@@ -27351,8 +27513,8 @@
           </a:p>
         </p:txBody>
       </p:sp>
-      <mc:AlternateContent xmlns:mc="http://schemas.openxmlformats.org/markup-compatibility/2006">
-        <mc:Choice xmlns:a14="http://schemas.microsoft.com/office/drawing/2010/main" Requires="a14">
+      <mc:AlternateContent xmlns:mc="http://schemas.openxmlformats.org/markup-compatibility/2006" xmlns:a14="http://schemas.microsoft.com/office/drawing/2010/main">
+        <mc:Choice Requires="a14">
           <p:sp>
             <p:nvSpPr>
               <p:cNvPr id="11" name="TextBox 10">
@@ -27432,7 +27594,7 @@
             </p:txBody>
           </p:sp>
         </mc:Choice>
-        <mc:Fallback>
+        <mc:Fallback xmlns="">
           <p:sp>
             <p:nvSpPr>
               <p:cNvPr id="11" name="TextBox 10">
@@ -29427,8 +29589,8 @@
           </a:p>
         </p:txBody>
       </p:sp>
-      <mc:AlternateContent xmlns:mc="http://schemas.openxmlformats.org/markup-compatibility/2006">
-        <mc:Choice xmlns:a14="http://schemas.microsoft.com/office/drawing/2010/main" Requires="a14">
+      <mc:AlternateContent xmlns:mc="http://schemas.openxmlformats.org/markup-compatibility/2006" xmlns:a14="http://schemas.microsoft.com/office/drawing/2010/main">
+        <mc:Choice Requires="a14">
           <p:sp>
             <p:nvSpPr>
               <p:cNvPr id="60" name="TextBox 59">
@@ -29583,7 +29745,7 @@
             </p:txBody>
           </p:sp>
         </mc:Choice>
-        <mc:Fallback>
+        <mc:Fallback xmlns="">
           <p:sp>
             <p:nvSpPr>
               <p:cNvPr id="60" name="TextBox 59">
@@ -29628,8 +29790,8 @@
           </p:sp>
         </mc:Fallback>
       </mc:AlternateContent>
-      <mc:AlternateContent xmlns:mc="http://schemas.openxmlformats.org/markup-compatibility/2006">
-        <mc:Choice xmlns:a14="http://schemas.microsoft.com/office/drawing/2010/main" Requires="a14">
+      <mc:AlternateContent xmlns:mc="http://schemas.openxmlformats.org/markup-compatibility/2006" xmlns:a14="http://schemas.microsoft.com/office/drawing/2010/main">
+        <mc:Choice Requires="a14">
           <p:sp>
             <p:nvSpPr>
               <p:cNvPr id="61" name="TextBox 60">
@@ -29740,7 +29902,6 @@
                 </a:endParaRPr>
               </a:p>
               <a:p>
-                <a:pPr/>
                 <a:r>
                   <a:rPr lang="en-GB" sz="2100" b="0" dirty="0"/>
                   <a:t>          </a:t>
@@ -30296,7 +30457,7 @@
             </p:txBody>
           </p:sp>
         </mc:Choice>
-        <mc:Fallback>
+        <mc:Fallback xmlns="">
           <p:sp>
             <p:nvSpPr>
               <p:cNvPr id="61" name="TextBox 60">
@@ -30341,8 +30502,8 @@
           </p:sp>
         </mc:Fallback>
       </mc:AlternateContent>
-      <mc:AlternateContent xmlns:mc="http://schemas.openxmlformats.org/markup-compatibility/2006">
-        <mc:Choice xmlns:a14="http://schemas.microsoft.com/office/drawing/2010/main" Requires="a14">
+      <mc:AlternateContent xmlns:mc="http://schemas.openxmlformats.org/markup-compatibility/2006" xmlns:a14="http://schemas.microsoft.com/office/drawing/2010/main">
+        <mc:Choice Requires="a14">
           <p:sp>
             <p:nvSpPr>
               <p:cNvPr id="62" name="TextBox 61">
@@ -30428,7 +30589,7 @@
             </p:txBody>
           </p:sp>
         </mc:Choice>
-        <mc:Fallback>
+        <mc:Fallback xmlns="">
           <p:sp>
             <p:nvSpPr>
               <p:cNvPr id="62" name="TextBox 61">
@@ -31304,12 +31465,6 @@
 </file>
 
 <file path=customXml/item1.xml><?xml version="1.0" encoding="utf-8"?>
-<p:properties xmlns:p="http://schemas.microsoft.com/office/2006/metadata/properties" xmlns:xsi="http://www.w3.org/2001/XMLSchema-instance" xmlns:pc="http://schemas.microsoft.com/office/infopath/2007/PartnerControls">
-  <documentManagement/>
-</p:properties>
-</file>
-
-<file path=customXml/item2.xml><?xml version="1.0" encoding="utf-8"?>
 <ct:contentTypeSchema xmlns:ct="http://schemas.microsoft.com/office/2006/metadata/contentType" xmlns:ma="http://schemas.microsoft.com/office/2006/metadata/properties/metaAttributes" ct:_="" ma:_="" ma:contentTypeName="Document" ma:contentTypeID="0x0101007188BDCA587B344BBA6CB1A93FAE6998" ma:contentTypeVersion="2" ma:contentTypeDescription="Create a new document." ma:contentTypeScope="" ma:versionID="7a8e4b6720badb2566a0cfeddfaf2856">
   <xsd:schema xmlns:xsd="http://www.w3.org/2001/XMLSchema" xmlns:xs="http://www.w3.org/2001/XMLSchema" xmlns:p="http://schemas.microsoft.com/office/2006/metadata/properties" xmlns:ns2="ba111d12-426d-4af0-bcb6-460e36974645" targetNamespace="http://schemas.microsoft.com/office/2006/metadata/properties" ma:root="true" ma:fieldsID="989b05398519136c88ba0a8d54e3c3da" ns2:_="">
     <xsd:import namespace="ba111d12-426d-4af0-bcb6-460e36974645"/>
@@ -31441,6 +31596,12 @@
 </ct:contentTypeSchema>
 </file>
 
+<file path=customXml/item2.xml><?xml version="1.0" encoding="utf-8"?>
+<p:properties xmlns:p="http://schemas.microsoft.com/office/2006/metadata/properties" xmlns:xsi="http://www.w3.org/2001/XMLSchema-instance" xmlns:pc="http://schemas.microsoft.com/office/infopath/2007/PartnerControls">
+  <documentManagement/>
+</p:properties>
+</file>
+
 <file path=customXml/item3.xml><?xml version="1.0" encoding="utf-8"?>
 <?mso-contentType ?>
 <FormTemplates xmlns="http://schemas.microsoft.com/sharepoint/v3/contenttype/forms">
@@ -31451,15 +31612,6 @@
 </file>
 
 <file path=customXml/itemProps1.xml><?xml version="1.0" encoding="utf-8"?>
-<ds:datastoreItem xmlns:ds="http://schemas.openxmlformats.org/officeDocument/2006/customXml" ds:itemID="{A05518A6-09E4-4E11-AE7D-4C13722BEBC7}">
-  <ds:schemaRefs>
-    <ds:schemaRef ds:uri="http://schemas.microsoft.com/office/2006/metadata/properties"/>
-    <ds:schemaRef ds:uri="http://schemas.microsoft.com/office/infopath/2007/PartnerControls"/>
-  </ds:schemaRefs>
-</ds:datastoreItem>
-</file>
-
-<file path=customXml/itemProps2.xml><?xml version="1.0" encoding="utf-8"?>
 <ds:datastoreItem xmlns:ds="http://schemas.openxmlformats.org/officeDocument/2006/customXml" ds:itemID="{46BFEDF5-8B64-4FF5-9637-4791A1C152B8}">
   <ds:schemaRefs>
     <ds:schemaRef ds:uri="http://schemas.microsoft.com/office/2006/metadata/contentType"/>
@@ -31477,6 +31629,15 @@
 </ds:datastoreItem>
 </file>
 
+<file path=customXml/itemProps2.xml><?xml version="1.0" encoding="utf-8"?>
+<ds:datastoreItem xmlns:ds="http://schemas.openxmlformats.org/officeDocument/2006/customXml" ds:itemID="{A05518A6-09E4-4E11-AE7D-4C13722BEBC7}">
+  <ds:schemaRefs>
+    <ds:schemaRef ds:uri="http://schemas.microsoft.com/office/2006/metadata/properties"/>
+    <ds:schemaRef ds:uri="http://schemas.microsoft.com/office/infopath/2007/PartnerControls"/>
+  </ds:schemaRefs>
+</ds:datastoreItem>
+</file>
+
 <file path=customXml/itemProps3.xml><?xml version="1.0" encoding="utf-8"?>
 <ds:datastoreItem xmlns:ds="http://schemas.openxmlformats.org/officeDocument/2006/customXml" ds:itemID="{AE0C03B0-3DE5-4BD9-B3BB-6E4919CD06B4}">
   <ds:schemaRefs>

</xml_diff>